<commit_message>
PA1 - Update to Stakeholder
</commit_message>
<xml_diff>
--- a/Meet Our Team - Org Chart.pptx
+++ b/Meet Our Team - Org Chart.pptx
@@ -6328,7 +6328,7 @@
 </file>
 
 <file path=ppt/slides/slide1.xml><?xml version="1.0" encoding="utf-8"?>
-<p:sld xmlns:a="http://schemas.openxmlformats.org/drawingml/2006/main" xmlns:r="http://schemas.openxmlformats.org/officeDocument/2006/relationships" xmlns:p="http://schemas.openxmlformats.org/presentationml/2006/main" show="0">
+<p:sld xmlns:a="http://schemas.openxmlformats.org/drawingml/2006/main" xmlns:r="http://schemas.openxmlformats.org/officeDocument/2006/relationships" xmlns:p="http://schemas.openxmlformats.org/presentationml/2006/main">
   <p:cSld>
     <p:spTree>
       <p:nvGrpSpPr>
@@ -18851,7 +18851,7 @@
 </file>
 
 <file path=ppt/slides/slide2.xml><?xml version="1.0" encoding="utf-8"?>
-<p:sld xmlns:a="http://schemas.openxmlformats.org/drawingml/2006/main" xmlns:r="http://schemas.openxmlformats.org/officeDocument/2006/relationships" xmlns:p="http://schemas.openxmlformats.org/presentationml/2006/main" show="0">
+<p:sld xmlns:a="http://schemas.openxmlformats.org/drawingml/2006/main" xmlns:r="http://schemas.openxmlformats.org/officeDocument/2006/relationships" xmlns:p="http://schemas.openxmlformats.org/presentationml/2006/main">
   <p:cSld>
     <p:spTree>
       <p:nvGrpSpPr>
@@ -28430,7 +28430,7 @@
 </file>
 
 <file path=ppt/slides/slide3.xml><?xml version="1.0" encoding="utf-8"?>
-<p:sld xmlns:a="http://schemas.openxmlformats.org/drawingml/2006/main" xmlns:r="http://schemas.openxmlformats.org/officeDocument/2006/relationships" xmlns:p="http://schemas.openxmlformats.org/presentationml/2006/main">
+<p:sld xmlns:a="http://schemas.openxmlformats.org/drawingml/2006/main" xmlns:r="http://schemas.openxmlformats.org/officeDocument/2006/relationships" xmlns:p="http://schemas.openxmlformats.org/presentationml/2006/main" show="0">
   <p:cSld>
     <p:spTree>
       <p:nvGrpSpPr>

</xml_diff>